<commit_message>
Added References to Presentation -b
</commit_message>
<xml_diff>
--- a/project-files/Aviation-Accident-Analysis.pptx
+++ b/project-files/Aviation-Accident-Analysis.pptx
@@ -18,6 +18,7 @@
     <p:sldId id="261" r:id="rId12"/>
     <p:sldId id="262" r:id="rId13"/>
     <p:sldId id="260" r:id="rId14"/>
+    <p:sldId id="269" r:id="rId15"/>
   </p:sldIdLst>
   <p:sldSz cx="12192000" cy="6858000"/>
   <p:notesSz cx="6858000" cy="9144000"/>
@@ -126,6 +127,53 @@
 
 <file path=ppt/changesInfos/changesInfo1.xml><?xml version="1.0" encoding="utf-8"?>
 <pc:chgInfo xmlns:a="http://schemas.openxmlformats.org/drawingml/2006/main" xmlns:r="http://schemas.openxmlformats.org/officeDocument/2006/relationships" xmlns:ac="http://schemas.microsoft.com/office/drawing/2013/main/command" xmlns:pc="http://schemas.microsoft.com/office/powerpoint/2013/main/command">
+  <pc:docChgLst>
+    <pc:chgData name="BRIAN WAWERU" userId="3fb8e1fabb4e43de" providerId="LiveId" clId="{96D003EF-2576-412D-8E6E-DDEE88524008}"/>
+    <pc:docChg chg="undo custSel addSld modSld">
+      <pc:chgData name="BRIAN WAWERU" userId="3fb8e1fabb4e43de" providerId="LiveId" clId="{96D003EF-2576-412D-8E6E-DDEE88524008}" dt="2025-02-14T16:02:16.874" v="75" actId="113"/>
+      <pc:docMkLst>
+        <pc:docMk/>
+      </pc:docMkLst>
+      <pc:sldChg chg="modSp mod">
+        <pc:chgData name="BRIAN WAWERU" userId="3fb8e1fabb4e43de" providerId="LiveId" clId="{96D003EF-2576-412D-8E6E-DDEE88524008}" dt="2025-02-14T14:42:33.249" v="1" actId="21"/>
+        <pc:sldMkLst>
+          <pc:docMk/>
+          <pc:sldMk cId="285880447" sldId="256"/>
+        </pc:sldMkLst>
+        <pc:spChg chg="mod">
+          <ac:chgData name="BRIAN WAWERU" userId="3fb8e1fabb4e43de" providerId="LiveId" clId="{96D003EF-2576-412D-8E6E-DDEE88524008}" dt="2025-02-14T14:42:33.249" v="1" actId="21"/>
+          <ac:spMkLst>
+            <pc:docMk/>
+            <pc:sldMk cId="285880447" sldId="256"/>
+            <ac:spMk id="2" creationId="{A853BA7F-5EB1-5F90-A93B-4CC8BE104C4B}"/>
+          </ac:spMkLst>
+        </pc:spChg>
+      </pc:sldChg>
+      <pc:sldChg chg="modSp new mod">
+        <pc:chgData name="BRIAN WAWERU" userId="3fb8e1fabb4e43de" providerId="LiveId" clId="{96D003EF-2576-412D-8E6E-DDEE88524008}" dt="2025-02-14T16:02:16.874" v="75" actId="113"/>
+        <pc:sldMkLst>
+          <pc:docMk/>
+          <pc:sldMk cId="2258339404" sldId="269"/>
+        </pc:sldMkLst>
+        <pc:spChg chg="mod">
+          <ac:chgData name="BRIAN WAWERU" userId="3fb8e1fabb4e43de" providerId="LiveId" clId="{96D003EF-2576-412D-8E6E-DDEE88524008}" dt="2025-02-14T16:00:45.580" v="17" actId="403"/>
+          <ac:spMkLst>
+            <pc:docMk/>
+            <pc:sldMk cId="2258339404" sldId="269"/>
+            <ac:spMk id="2" creationId="{5A09A7BC-82DC-0F74-778E-7368FF68F869}"/>
+          </ac:spMkLst>
+        </pc:spChg>
+        <pc:spChg chg="mod">
+          <ac:chgData name="BRIAN WAWERU" userId="3fb8e1fabb4e43de" providerId="LiveId" clId="{96D003EF-2576-412D-8E6E-DDEE88524008}" dt="2025-02-14T16:02:16.874" v="75" actId="113"/>
+          <ac:spMkLst>
+            <pc:docMk/>
+            <pc:sldMk cId="2258339404" sldId="269"/>
+            <ac:spMk id="3" creationId="{B7FC1CB5-28DC-9DEA-0057-B474DE9B2EA2}"/>
+          </ac:spMkLst>
+        </pc:spChg>
+      </pc:sldChg>
+    </pc:docChg>
+  </pc:docChgLst>
   <pc:docChgLst>
     <pc:chgData name="BRIAN WAWERU" userId="3fb8e1fabb4e43de" providerId="LiveId" clId="{CC11B3C3-5339-4880-8000-3559BB9B68A6}"/>
     <pc:docChg chg="undo custSel addSld modSld">
@@ -564,7 +612,7 @@
           <a:p>
             <a:fld id="{BFD5F710-CBA8-4918-A5B2-A827B8B90A4B}" type="datetimeFigureOut">
               <a:rPr lang="en-KE" smtClean="0"/>
-              <a:t>12/02/2025</a:t>
+              <a:t>14/02/2025</a:t>
             </a:fld>
             <a:endParaRPr lang="en-KE"/>
           </a:p>
@@ -1652,7 +1700,7 @@
           <a:p>
             <a:fld id="{BFD5F710-CBA8-4918-A5B2-A827B8B90A4B}" type="datetimeFigureOut">
               <a:rPr lang="en-KE" smtClean="0"/>
-              <a:t>12/02/2025</a:t>
+              <a:t>14/02/2025</a:t>
             </a:fld>
             <a:endParaRPr lang="en-KE"/>
           </a:p>
@@ -2632,7 +2680,7 @@
           <a:p>
             <a:fld id="{BFD5F710-CBA8-4918-A5B2-A827B8B90A4B}" type="datetimeFigureOut">
               <a:rPr lang="en-KE" smtClean="0"/>
-              <a:t>12/02/2025</a:t>
+              <a:t>14/02/2025</a:t>
             </a:fld>
             <a:endParaRPr lang="en-KE"/>
           </a:p>
@@ -3766,7 +3814,7 @@
           <a:p>
             <a:fld id="{BFD5F710-CBA8-4918-A5B2-A827B8B90A4B}" type="datetimeFigureOut">
               <a:rPr lang="en-KE" smtClean="0"/>
-              <a:t>12/02/2025</a:t>
+              <a:t>14/02/2025</a:t>
             </a:fld>
             <a:endParaRPr lang="en-KE"/>
           </a:p>
@@ -4799,7 +4847,7 @@
           <a:p>
             <a:fld id="{BFD5F710-CBA8-4918-A5B2-A827B8B90A4B}" type="datetimeFigureOut">
               <a:rPr lang="en-KE" smtClean="0"/>
-              <a:t>12/02/2025</a:t>
+              <a:t>14/02/2025</a:t>
             </a:fld>
             <a:endParaRPr lang="en-KE"/>
           </a:p>
@@ -5459,7 +5507,7 @@
           <a:p>
             <a:fld id="{BFD5F710-CBA8-4918-A5B2-A827B8B90A4B}" type="datetimeFigureOut">
               <a:rPr lang="en-KE" smtClean="0"/>
-              <a:t>12/02/2025</a:t>
+              <a:t>14/02/2025</a:t>
             </a:fld>
             <a:endParaRPr lang="en-KE"/>
           </a:p>
@@ -6320,7 +6368,7 @@
           <a:p>
             <a:fld id="{BFD5F710-CBA8-4918-A5B2-A827B8B90A4B}" type="datetimeFigureOut">
               <a:rPr lang="en-KE" smtClean="0"/>
-              <a:t>12/02/2025</a:t>
+              <a:t>14/02/2025</a:t>
             </a:fld>
             <a:endParaRPr lang="en-KE"/>
           </a:p>
@@ -6510,7 +6558,7 @@
           <a:p>
             <a:fld id="{BFD5F710-CBA8-4918-A5B2-A827B8B90A4B}" type="datetimeFigureOut">
               <a:rPr lang="en-KE" smtClean="0"/>
-              <a:t>12/02/2025</a:t>
+              <a:t>14/02/2025</a:t>
             </a:fld>
             <a:endParaRPr lang="en-KE"/>
           </a:p>
@@ -7482,7 +7530,7 @@
           <a:p>
             <a:fld id="{BFD5F710-CBA8-4918-A5B2-A827B8B90A4B}" type="datetimeFigureOut">
               <a:rPr lang="en-KE" smtClean="0"/>
-              <a:t>12/02/2025</a:t>
+              <a:t>14/02/2025</a:t>
             </a:fld>
             <a:endParaRPr lang="en-KE"/>
           </a:p>
@@ -7693,7 +7741,7 @@
           <a:p>
             <a:fld id="{BFD5F710-CBA8-4918-A5B2-A827B8B90A4B}" type="datetimeFigureOut">
               <a:rPr lang="en-KE" smtClean="0"/>
-              <a:t>12/02/2025</a:t>
+              <a:t>14/02/2025</a:t>
             </a:fld>
             <a:endParaRPr lang="en-KE"/>
           </a:p>
@@ -8727,7 +8775,7 @@
           <a:p>
             <a:fld id="{BFD5F710-CBA8-4918-A5B2-A827B8B90A4B}" type="datetimeFigureOut">
               <a:rPr lang="en-KE" smtClean="0"/>
-              <a:t>12/02/2025</a:t>
+              <a:t>14/02/2025</a:t>
             </a:fld>
             <a:endParaRPr lang="en-KE"/>
           </a:p>
@@ -8999,7 +9047,7 @@
           <a:p>
             <a:fld id="{BFD5F710-CBA8-4918-A5B2-A827B8B90A4B}" type="datetimeFigureOut">
               <a:rPr lang="en-KE" smtClean="0"/>
-              <a:t>12/02/2025</a:t>
+              <a:t>14/02/2025</a:t>
             </a:fld>
             <a:endParaRPr lang="en-KE"/>
           </a:p>
@@ -9409,7 +9457,7 @@
           <a:p>
             <a:fld id="{BFD5F710-CBA8-4918-A5B2-A827B8B90A4B}" type="datetimeFigureOut">
               <a:rPr lang="en-KE" smtClean="0"/>
-              <a:t>12/02/2025</a:t>
+              <a:t>14/02/2025</a:t>
             </a:fld>
             <a:endParaRPr lang="en-KE"/>
           </a:p>
@@ -9536,7 +9584,7 @@
           <a:p>
             <a:fld id="{BFD5F710-CBA8-4918-A5B2-A827B8B90A4B}" type="datetimeFigureOut">
               <a:rPr lang="en-KE" smtClean="0"/>
-              <a:t>12/02/2025</a:t>
+              <a:t>14/02/2025</a:t>
             </a:fld>
             <a:endParaRPr lang="en-KE"/>
           </a:p>
@@ -9631,7 +9679,7 @@
           <a:p>
             <a:fld id="{BFD5F710-CBA8-4918-A5B2-A827B8B90A4B}" type="datetimeFigureOut">
               <a:rPr lang="en-KE" smtClean="0"/>
-              <a:t>12/02/2025</a:t>
+              <a:t>14/02/2025</a:t>
             </a:fld>
             <a:endParaRPr lang="en-KE"/>
           </a:p>
@@ -10712,7 +10760,7 @@
           <a:p>
             <a:fld id="{BFD5F710-CBA8-4918-A5B2-A827B8B90A4B}" type="datetimeFigureOut">
               <a:rPr lang="en-KE" smtClean="0"/>
-              <a:t>12/02/2025</a:t>
+              <a:t>14/02/2025</a:t>
             </a:fld>
             <a:endParaRPr lang="en-KE"/>
           </a:p>
@@ -11820,7 +11868,7 @@
           <a:p>
             <a:fld id="{BFD5F710-CBA8-4918-A5B2-A827B8B90A4B}" type="datetimeFigureOut">
               <a:rPr lang="en-KE" smtClean="0"/>
-              <a:t>12/02/2025</a:t>
+              <a:t>14/02/2025</a:t>
             </a:fld>
             <a:endParaRPr lang="en-KE"/>
           </a:p>
@@ -12817,7 +12865,7 @@
           <a:p>
             <a:fld id="{BFD5F710-CBA8-4918-A5B2-A827B8B90A4B}" type="datetimeFigureOut">
               <a:rPr lang="en-KE" smtClean="0"/>
-              <a:t>12/02/2025</a:t>
+              <a:t>14/02/2025</a:t>
             </a:fld>
             <a:endParaRPr lang="en-KE"/>
           </a:p>
@@ -13831,6 +13879,133 @@
     <p:extLst>
       <p:ext uri="{BB962C8B-B14F-4D97-AF65-F5344CB8AC3E}">
         <p14:creationId xmlns:p14="http://schemas.microsoft.com/office/powerpoint/2010/main" val="1382671887"/>
+      </p:ext>
+    </p:extLst>
+  </p:cSld>
+  <p:clrMapOvr>
+    <a:masterClrMapping/>
+  </p:clrMapOvr>
+</p:sld>
+</file>
+
+<file path=ppt/slides/slide14.xml><?xml version="1.0" encoding="utf-8"?>
+<p:sld xmlns:a="http://schemas.openxmlformats.org/drawingml/2006/main" xmlns:r="http://schemas.openxmlformats.org/officeDocument/2006/relationships" xmlns:p="http://schemas.openxmlformats.org/presentationml/2006/main">
+  <p:cSld>
+    <p:spTree>
+      <p:nvGrpSpPr>
+        <p:cNvPr id="1" name=""/>
+        <p:cNvGrpSpPr/>
+        <p:nvPr/>
+      </p:nvGrpSpPr>
+      <p:grpSpPr>
+        <a:xfrm>
+          <a:off x="0" y="0"/>
+          <a:ext cx="0" cy="0"/>
+          <a:chOff x="0" y="0"/>
+          <a:chExt cx="0" cy="0"/>
+        </a:xfrm>
+      </p:grpSpPr>
+      <p:sp>
+        <p:nvSpPr>
+          <p:cNvPr id="2" name="Title 1">
+            <a:extLst>
+              <a:ext uri="{FF2B5EF4-FFF2-40B4-BE49-F238E27FC236}">
+                <a16:creationId xmlns:a16="http://schemas.microsoft.com/office/drawing/2014/main" id="{5A09A7BC-82DC-0F74-778E-7368FF68F869}"/>
+              </a:ext>
+            </a:extLst>
+          </p:cNvPr>
+          <p:cNvSpPr>
+            <a:spLocks noGrp="1"/>
+          </p:cNvSpPr>
+          <p:nvPr>
+            <p:ph type="title"/>
+          </p:nvPr>
+        </p:nvSpPr>
+        <p:spPr/>
+        <p:txBody>
+          <a:bodyPr/>
+          <a:lstStyle/>
+          <a:p>
+            <a:pPr algn="ctr"/>
+            <a:r>
+              <a:rPr lang="en-US" sz="4800" b="1" dirty="0"/>
+              <a:t>References</a:t>
+            </a:r>
+            <a:endParaRPr lang="en-KE" sz="4800" b="1" dirty="0"/>
+          </a:p>
+        </p:txBody>
+      </p:sp>
+      <p:sp>
+        <p:nvSpPr>
+          <p:cNvPr id="3" name="Content Placeholder 2">
+            <a:extLst>
+              <a:ext uri="{FF2B5EF4-FFF2-40B4-BE49-F238E27FC236}">
+                <a16:creationId xmlns:a16="http://schemas.microsoft.com/office/drawing/2014/main" id="{B7FC1CB5-28DC-9DEA-0057-B474DE9B2EA2}"/>
+              </a:ext>
+            </a:extLst>
+          </p:cNvPr>
+          <p:cNvSpPr>
+            <a:spLocks noGrp="1"/>
+          </p:cNvSpPr>
+          <p:nvPr>
+            <p:ph idx="1"/>
+          </p:nvPr>
+        </p:nvSpPr>
+        <p:spPr/>
+        <p:txBody>
+          <a:bodyPr>
+            <a:normAutofit/>
+          </a:bodyPr>
+          <a:lstStyle/>
+          <a:p>
+            <a:pPr>
+              <a:buFont typeface="+mj-lt"/>
+              <a:buAutoNum type="arabicPeriod"/>
+            </a:pPr>
+            <a:r>
+              <a:rPr lang="en-US" sz="2400" b="1" dirty="0"/>
+              <a:t>Tableau-Visualization: </a:t>
+            </a:r>
+            <a:r>
+              <a:rPr lang="en-KE" sz="2400" dirty="0">
+                <a:hlinkClick r:id="rId2"/>
+              </a:rPr>
+              <a:t>https://public.tableau.com/authoring/waweru-dsc-phase-1-project-viz-v2/Sheet1/Dashboard%201#1</a:t>
+            </a:r>
+            <a:endParaRPr lang="en-US" sz="2400" dirty="0"/>
+          </a:p>
+          <a:p>
+            <a:pPr>
+              <a:buFont typeface="+mj-lt"/>
+              <a:buAutoNum type="arabicPeriod"/>
+            </a:pPr>
+            <a:r>
+              <a:rPr lang="en-US" sz="2400" b="1" dirty="0"/>
+              <a:t>Git-Repository:</a:t>
+            </a:r>
+            <a:br>
+              <a:rPr lang="en-US" sz="2400" dirty="0"/>
+            </a:br>
+            <a:r>
+              <a:rPr lang="en-US" sz="2400" dirty="0" err="1">
+                <a:hlinkClick r:id="rId3"/>
+              </a:rPr>
+              <a:t>rurigi-waweru</a:t>
+            </a:r>
+            <a:r>
+              <a:rPr lang="en-US" sz="2400" dirty="0">
+                <a:hlinkClick r:id="rId3"/>
+              </a:rPr>
+              <a:t>/dsfpt10-p1-dsc-phase-1-project: Phase-01-Final-Project, 09-02-2025</a:t>
+            </a:r>
+            <a:endParaRPr lang="en-US" sz="2400" dirty="0"/>
+          </a:p>
+        </p:txBody>
+      </p:sp>
+    </p:spTree>
+    <p:extLst>
+      <p:ext uri="{BB962C8B-B14F-4D97-AF65-F5344CB8AC3E}">
+        <p14:creationId xmlns:p14="http://schemas.microsoft.com/office/powerpoint/2010/main" val="2258339404"/>
       </p:ext>
     </p:extLst>
   </p:cSld>

</xml_diff>

<commit_message>
Added more References to Presentation -b
</commit_message>
<xml_diff>
--- a/project-files/Aviation-Accident-Analysis.pptx
+++ b/project-files/Aviation-Accident-Analysis.pptx
@@ -130,7 +130,7 @@
   <pc:docChgLst>
     <pc:chgData name="BRIAN WAWERU" userId="3fb8e1fabb4e43de" providerId="LiveId" clId="{96D003EF-2576-412D-8E6E-DDEE88524008}"/>
     <pc:docChg chg="undo custSel addSld modSld">
-      <pc:chgData name="BRIAN WAWERU" userId="3fb8e1fabb4e43de" providerId="LiveId" clId="{96D003EF-2576-412D-8E6E-DDEE88524008}" dt="2025-02-14T16:02:16.874" v="75" actId="113"/>
+      <pc:chgData name="BRIAN WAWERU" userId="3fb8e1fabb4e43de" providerId="LiveId" clId="{96D003EF-2576-412D-8E6E-DDEE88524008}" dt="2025-02-14T16:36:18.376" v="167" actId="404"/>
       <pc:docMkLst>
         <pc:docMk/>
       </pc:docMkLst>
@@ -150,7 +150,7 @@
         </pc:spChg>
       </pc:sldChg>
       <pc:sldChg chg="modSp new mod">
-        <pc:chgData name="BRIAN WAWERU" userId="3fb8e1fabb4e43de" providerId="LiveId" clId="{96D003EF-2576-412D-8E6E-DDEE88524008}" dt="2025-02-14T16:02:16.874" v="75" actId="113"/>
+        <pc:chgData name="BRIAN WAWERU" userId="3fb8e1fabb4e43de" providerId="LiveId" clId="{96D003EF-2576-412D-8E6E-DDEE88524008}" dt="2025-02-14T16:36:18.376" v="167" actId="404"/>
         <pc:sldMkLst>
           <pc:docMk/>
           <pc:sldMk cId="2258339404" sldId="269"/>
@@ -164,7 +164,7 @@
           </ac:spMkLst>
         </pc:spChg>
         <pc:spChg chg="mod">
-          <ac:chgData name="BRIAN WAWERU" userId="3fb8e1fabb4e43de" providerId="LiveId" clId="{96D003EF-2576-412D-8E6E-DDEE88524008}" dt="2025-02-14T16:02:16.874" v="75" actId="113"/>
+          <ac:chgData name="BRIAN WAWERU" userId="3fb8e1fabb4e43de" providerId="LiveId" clId="{96D003EF-2576-412D-8E6E-DDEE88524008}" dt="2025-02-14T16:36:18.376" v="167" actId="404"/>
           <ac:spMkLst>
             <pc:docMk/>
             <pc:sldMk cId="2258339404" sldId="269"/>
@@ -13951,7 +13951,12 @@
             <p:ph idx="1"/>
           </p:nvPr>
         </p:nvSpPr>
-        <p:spPr/>
+        <p:spPr>
+          <a:xfrm>
+            <a:off x="474134" y="2603499"/>
+            <a:ext cx="11243733" cy="3932767"/>
+          </a:xfrm>
+        </p:spPr>
         <p:txBody>
           <a:bodyPr>
             <a:normAutofit/>
@@ -13966,11 +13971,37 @@
               <a:rPr lang="en-US" sz="2400" b="1" dirty="0"/>
               <a:t>Tableau-Visualization: </a:t>
             </a:r>
+            <a:br>
+              <a:rPr lang="en-US" sz="2400" b="1" dirty="0"/>
+            </a:br>
+            <a:r>
+              <a:rPr lang="en-US" sz="1600" dirty="0"/>
+              <a:t>Version 2:</a:t>
+            </a:r>
+            <a:br>
+              <a:rPr lang="en-US" sz="2400" dirty="0"/>
+            </a:br>
             <a:r>
               <a:rPr lang="en-KE" sz="2400" dirty="0">
                 <a:hlinkClick r:id="rId2"/>
               </a:rPr>
               <a:t>https://public.tableau.com/authoring/waweru-dsc-phase-1-project-viz-v2/Sheet1/Dashboard%201#1</a:t>
+            </a:r>
+            <a:br>
+              <a:rPr lang="en-US" sz="2400" dirty="0"/>
+            </a:br>
+            <a:r>
+              <a:rPr lang="en-US" sz="1600" dirty="0"/>
+              <a:t>Version 3:</a:t>
+            </a:r>
+            <a:br>
+              <a:rPr lang="en-US" sz="2400" dirty="0"/>
+            </a:br>
+            <a:r>
+              <a:rPr lang="en-US" sz="2400" dirty="0">
+                <a:hlinkClick r:id="rId3"/>
+              </a:rPr>
+              <a:t>https://public.tableau.com/app/profile/brian.waweru/viz/waweru-dsc-phase-1-project-viz-v3/Dashboard1?publish=yes</a:t>
             </a:r>
             <a:endParaRPr lang="en-US" sz="2400" dirty="0"/>
           </a:p>
@@ -13988,13 +14019,13 @@
             </a:br>
             <a:r>
               <a:rPr lang="en-US" sz="2400" dirty="0" err="1">
-                <a:hlinkClick r:id="rId3"/>
+                <a:hlinkClick r:id="rId4"/>
               </a:rPr>
               <a:t>rurigi-waweru</a:t>
             </a:r>
             <a:r>
               <a:rPr lang="en-US" sz="2400" dirty="0">
-                <a:hlinkClick r:id="rId3"/>
+                <a:hlinkClick r:id="rId4"/>
               </a:rPr>
               <a:t>/dsfpt10-p1-dsc-phase-1-project: Phase-01-Final-Project, 09-02-2025</a:t>
             </a:r>

</xml_diff>